<commit_message>
Work on final document
</commit_message>
<xml_diff>
--- a/Documents/הגשת פרויקט/לסרטון.pptx
+++ b/Documents/הגשת פרויקט/לסרטון.pptx
@@ -11352,14 +11352,14 @@
           <a:lstStyle/>
           <a:p>
             <a:r>
-              <a:rPr lang="he-IL"/>
+              <a:rPr lang="he-IL" dirty="0"/>
               <a:t>מִי בָכֶם מִכָּל עַמּוֹ ה’ אֱלֹהָיו עִמּוֹ וְיָעַל</a:t>
             </a:r>
             <a:r>
-              <a:rPr lang="he-IL"/>
+              <a:rPr lang="he-IL" dirty="0"/>
               <a:t>". </a:t>
             </a:r>
-            <a:endParaRPr lang="he-IL"/>
+            <a:endParaRPr lang="he-IL" dirty="0"/>
           </a:p>
         </p:txBody>
       </p:sp>

</xml_diff>